<commit_message>
Updated examples for unioffice v1.16.0
</commit_message>
<xml_diff>
--- a/presentation/convert_to_pdf/picture.pptx
+++ b/presentation/convert_to_pdf/picture.pptx
@@ -104,6 +104,11 @@
       </a:defRPr>
     </a:lvl9pPr>
   </p:defaultTextStyle>
+  <p:extLst>
+    <p:ext uri="{EFAFB233-063F-42B5-8137-9DF3F51BA10A}">
+      <p15:sldGuideLst xmlns:p15="http://schemas.microsoft.com/office/powerpoint/2012/main"/>
+    </p:ext>
+  </p:extLst>
 </p:presentation>
 </file>
 
@@ -316,7 +321,7 @@
           <a:p>
             <a:fld id="{C485584D-7D79-4248-9986-4CA35242F944}" type="datetimeFigureOut">
               <a:rPr lang="en-US" smtClean="0"/>
-              <a:t>8/24/21</a:t>
+              <a:t>9/23/21</a:t>
             </a:fld>
             <a:endParaRPr lang="en-US"/>
           </a:p>
@@ -690,7 +695,7 @@
           <a:p>
             <a:fld id="{C485584D-7D79-4248-9986-4CA35242F944}" type="datetimeFigureOut">
               <a:rPr lang="en-US" smtClean="0"/>
-              <a:t>8/24/21</a:t>
+              <a:t>9/23/21</a:t>
             </a:fld>
             <a:endParaRPr lang="en-US"/>
           </a:p>
@@ -900,7 +905,7 @@
           <a:p>
             <a:fld id="{C485584D-7D79-4248-9986-4CA35242F944}" type="datetimeFigureOut">
               <a:rPr lang="en-US" smtClean="0"/>
-              <a:t>8/24/21</a:t>
+              <a:t>9/23/21</a:t>
             </a:fld>
             <a:endParaRPr lang="en-US"/>
           </a:p>
@@ -1099,7 +1104,7 @@
           <a:p>
             <a:fld id="{C485584D-7D79-4248-9986-4CA35242F944}" type="datetimeFigureOut">
               <a:rPr lang="en-US" smtClean="0"/>
-              <a:t>8/24/21</a:t>
+              <a:t>9/23/21</a:t>
             </a:fld>
             <a:endParaRPr lang="en-US"/>
           </a:p>
@@ -1212,7 +1217,7 @@
           <a:p>
             <a:fld id="{C485584D-7D79-4248-9986-4CA35242F944}" type="datetimeFigureOut">
               <a:rPr lang="en-US" smtClean="0"/>
-              <a:t>8/24/21</a:t>
+              <a:t>9/23/21</a:t>
             </a:fld>
             <a:endParaRPr lang="en-US"/>
           </a:p>
@@ -1948,7 +1953,7 @@
           <a:p>
             <a:fld id="{C485584D-7D79-4248-9986-4CA35242F944}" type="datetimeFigureOut">
               <a:rPr lang="en-US" smtClean="0"/>
-              <a:t>8/24/21</a:t>
+              <a:t>9/23/21</a:t>
             </a:fld>
             <a:endParaRPr lang="en-US"/>
           </a:p>
@@ -2364,7 +2369,7 @@
           <a:p>
             <a:fld id="{C485584D-7D79-4248-9986-4CA35242F944}" type="datetimeFigureOut">
               <a:rPr lang="en-US" smtClean="0"/>
-              <a:t>8/24/21</a:t>
+              <a:t>9/23/21</a:t>
             </a:fld>
             <a:endParaRPr lang="en-US"/>
           </a:p>
@@ -2505,7 +2510,7 @@
           <a:p>
             <a:fld id="{C485584D-7D79-4248-9986-4CA35242F944}" type="datetimeFigureOut">
               <a:rPr lang="en-US" smtClean="0"/>
-              <a:t>8/24/21</a:t>
+              <a:t>9/23/21</a:t>
             </a:fld>
             <a:endParaRPr lang="en-US"/>
           </a:p>
@@ -2618,7 +2623,7 @@
           <a:p>
             <a:fld id="{C485584D-7D79-4248-9986-4CA35242F944}" type="datetimeFigureOut">
               <a:rPr lang="en-US" smtClean="0"/>
-              <a:t>8/24/21</a:t>
+              <a:t>9/23/21</a:t>
             </a:fld>
             <a:endParaRPr lang="en-US"/>
           </a:p>
@@ -2931,7 +2936,7 @@
           <a:p>
             <a:fld id="{C485584D-7D79-4248-9986-4CA35242F944}" type="datetimeFigureOut">
               <a:rPr lang="en-US" smtClean="0"/>
-              <a:t>8/24/21</a:t>
+              <a:t>9/23/21</a:t>
             </a:fld>
             <a:endParaRPr lang="en-US"/>
           </a:p>
@@ -3223,7 +3228,7 @@
           <a:p>
             <a:fld id="{C485584D-7D79-4248-9986-4CA35242F944}" type="datetimeFigureOut">
               <a:rPr lang="en-US" smtClean="0"/>
-              <a:t>8/24/21</a:t>
+              <a:t>9/23/21</a:t>
             </a:fld>
             <a:endParaRPr lang="en-US"/>
           </a:p>
@@ -3507,7 +3512,7 @@
           <a:p>
             <a:fld id="{C485584D-7D79-4248-9986-4CA35242F944}" type="datetimeFigureOut">
               <a:rPr lang="en-US" smtClean="0"/>
-              <a:t>8/24/21</a:t>
+              <a:t>9/23/21</a:t>
             </a:fld>
             <a:endParaRPr lang="en-US"/>
           </a:p>

</xml_diff>

<commit_message>
Updated examples for unioffice v1.16.0 (#18)
</commit_message>
<xml_diff>
--- a/presentation/convert_to_pdf/picture.pptx
+++ b/presentation/convert_to_pdf/picture.pptx
@@ -104,6 +104,11 @@
       </a:defRPr>
     </a:lvl9pPr>
   </p:defaultTextStyle>
+  <p:extLst>
+    <p:ext uri="{EFAFB233-063F-42B5-8137-9DF3F51BA10A}">
+      <p15:sldGuideLst xmlns:p15="http://schemas.microsoft.com/office/powerpoint/2012/main"/>
+    </p:ext>
+  </p:extLst>
 </p:presentation>
 </file>
 
@@ -316,7 +321,7 @@
           <a:p>
             <a:fld id="{C485584D-7D79-4248-9986-4CA35242F944}" type="datetimeFigureOut">
               <a:rPr lang="en-US" smtClean="0"/>
-              <a:t>8/24/21</a:t>
+              <a:t>9/23/21</a:t>
             </a:fld>
             <a:endParaRPr lang="en-US"/>
           </a:p>
@@ -690,7 +695,7 @@
           <a:p>
             <a:fld id="{C485584D-7D79-4248-9986-4CA35242F944}" type="datetimeFigureOut">
               <a:rPr lang="en-US" smtClean="0"/>
-              <a:t>8/24/21</a:t>
+              <a:t>9/23/21</a:t>
             </a:fld>
             <a:endParaRPr lang="en-US"/>
           </a:p>
@@ -900,7 +905,7 @@
           <a:p>
             <a:fld id="{C485584D-7D79-4248-9986-4CA35242F944}" type="datetimeFigureOut">
               <a:rPr lang="en-US" smtClean="0"/>
-              <a:t>8/24/21</a:t>
+              <a:t>9/23/21</a:t>
             </a:fld>
             <a:endParaRPr lang="en-US"/>
           </a:p>
@@ -1099,7 +1104,7 @@
           <a:p>
             <a:fld id="{C485584D-7D79-4248-9986-4CA35242F944}" type="datetimeFigureOut">
               <a:rPr lang="en-US" smtClean="0"/>
-              <a:t>8/24/21</a:t>
+              <a:t>9/23/21</a:t>
             </a:fld>
             <a:endParaRPr lang="en-US"/>
           </a:p>
@@ -1212,7 +1217,7 @@
           <a:p>
             <a:fld id="{C485584D-7D79-4248-9986-4CA35242F944}" type="datetimeFigureOut">
               <a:rPr lang="en-US" smtClean="0"/>
-              <a:t>8/24/21</a:t>
+              <a:t>9/23/21</a:t>
             </a:fld>
             <a:endParaRPr lang="en-US"/>
           </a:p>
@@ -1948,7 +1953,7 @@
           <a:p>
             <a:fld id="{C485584D-7D79-4248-9986-4CA35242F944}" type="datetimeFigureOut">
               <a:rPr lang="en-US" smtClean="0"/>
-              <a:t>8/24/21</a:t>
+              <a:t>9/23/21</a:t>
             </a:fld>
             <a:endParaRPr lang="en-US"/>
           </a:p>
@@ -2364,7 +2369,7 @@
           <a:p>
             <a:fld id="{C485584D-7D79-4248-9986-4CA35242F944}" type="datetimeFigureOut">
               <a:rPr lang="en-US" smtClean="0"/>
-              <a:t>8/24/21</a:t>
+              <a:t>9/23/21</a:t>
             </a:fld>
             <a:endParaRPr lang="en-US"/>
           </a:p>
@@ -2505,7 +2510,7 @@
           <a:p>
             <a:fld id="{C485584D-7D79-4248-9986-4CA35242F944}" type="datetimeFigureOut">
               <a:rPr lang="en-US" smtClean="0"/>
-              <a:t>8/24/21</a:t>
+              <a:t>9/23/21</a:t>
             </a:fld>
             <a:endParaRPr lang="en-US"/>
           </a:p>
@@ -2618,7 +2623,7 @@
           <a:p>
             <a:fld id="{C485584D-7D79-4248-9986-4CA35242F944}" type="datetimeFigureOut">
               <a:rPr lang="en-US" smtClean="0"/>
-              <a:t>8/24/21</a:t>
+              <a:t>9/23/21</a:t>
             </a:fld>
             <a:endParaRPr lang="en-US"/>
           </a:p>
@@ -2931,7 +2936,7 @@
           <a:p>
             <a:fld id="{C485584D-7D79-4248-9986-4CA35242F944}" type="datetimeFigureOut">
               <a:rPr lang="en-US" smtClean="0"/>
-              <a:t>8/24/21</a:t>
+              <a:t>9/23/21</a:t>
             </a:fld>
             <a:endParaRPr lang="en-US"/>
           </a:p>
@@ -3223,7 +3228,7 @@
           <a:p>
             <a:fld id="{C485584D-7D79-4248-9986-4CA35242F944}" type="datetimeFigureOut">
               <a:rPr lang="en-US" smtClean="0"/>
-              <a:t>8/24/21</a:t>
+              <a:t>9/23/21</a:t>
             </a:fld>
             <a:endParaRPr lang="en-US"/>
           </a:p>
@@ -3507,7 +3512,7 @@
           <a:p>
             <a:fld id="{C485584D-7D79-4248-9986-4CA35242F944}" type="datetimeFigureOut">
               <a:rPr lang="en-US" smtClean="0"/>
-              <a:t>8/24/21</a:t>
+              <a:t>9/23/21</a:t>
             </a:fld>
             <a:endParaRPr lang="en-US"/>
           </a:p>

</xml_diff>